<commit_message>
sugiyama suggestions, reverse orientation of level curves
</commit_message>
<xml_diff>
--- a/HOCKING-SVMcompare-sushi-slide.pptx
+++ b/HOCKING-SVMcompare-sushi-slide.pptx
@@ -176,7 +176,7 @@
           <a:bodyPr anchor="b" bIns="0" lIns="0" rIns="0" tIns="0" wrap="none"/>
           <a:p>
             <a:pPr algn="r"/>
-            <a:fld id="{A1F1C141-2131-41B1-91B1-5171E101A161}" type="slidenum">
+            <a:fld id="{D18121D1-01C1-41A1-91C1-01B1C14141E1}" type="slidenum">
               <a:rPr lang="en-US"/>
               <a:t>&lt;number&gt;</a:t>
             </a:fld>
@@ -220,7 +220,7 @@
         <p:spPr>
           <a:xfrm>
             <a:off x="0" y="0"/>
-            <a:ext cx="11796480" cy="11796480"/>
+            <a:ext cx="11795760" cy="11795760"/>
           </a:xfrm>
           <a:prstGeom prst="rect">
             <a:avLst/>
@@ -242,7 +242,7 @@
         <p:spPr>
           <a:xfrm>
             <a:off x="0" y="0"/>
-            <a:ext cx="11796480" cy="11796480"/>
+            <a:ext cx="11795760" cy="11795760"/>
           </a:xfrm>
           <a:prstGeom prst="rect">
             <a:avLst/>
@@ -256,7 +256,7 @@
                 <a:spcPct val="100000"/>
               </a:lnSpc>
             </a:pPr>
-            <a:fld id="{E1E1D141-4121-41D1-A1F1-01C131E101D1}" type="slidenum">
+            <a:fld id="{C1F10131-F161-41D1-91A1-41B1E141B151}" type="slidenum">
               <a:rPr lang="en-US" sz="600">
                 <a:solidFill>
                   <a:srgbClr val="000000"/>
@@ -326,8 +326,8 @@
         </p:nvSpPr>
         <p:spPr>
           <a:xfrm>
-            <a:off x="743040" y="2130480"/>
-            <a:ext cx="8418960" cy="1469880"/>
+            <a:off x="495000" y="273600"/>
+            <a:ext cx="8915040" cy="1145160"/>
           </a:xfrm>
           <a:prstGeom prst="rect">
             <a:avLst/>
@@ -427,8 +427,8 @@
         </p:nvSpPr>
         <p:spPr>
           <a:xfrm>
-            <a:off x="743040" y="2130480"/>
-            <a:ext cx="8418960" cy="1469880"/>
+            <a:off x="495000" y="273600"/>
+            <a:ext cx="8915040" cy="1145160"/>
           </a:xfrm>
           <a:prstGeom prst="rect">
             <a:avLst/>
@@ -580,8 +580,8 @@
         </p:nvSpPr>
         <p:spPr>
           <a:xfrm>
-            <a:off x="743040" y="2130480"/>
-            <a:ext cx="8418960" cy="1469880"/>
+            <a:off x="495000" y="273600"/>
+            <a:ext cx="8915040" cy="1145160"/>
           </a:xfrm>
           <a:prstGeom prst="rect">
             <a:avLst/>
@@ -681,8 +681,8 @@
         </p:nvSpPr>
         <p:spPr>
           <a:xfrm>
-            <a:off x="743040" y="2130480"/>
-            <a:ext cx="8418960" cy="1469880"/>
+            <a:off x="495000" y="273600"/>
+            <a:ext cx="8915040" cy="1145160"/>
           </a:xfrm>
           <a:prstGeom prst="rect">
             <a:avLst/>
@@ -757,8 +757,8 @@
         </p:nvSpPr>
         <p:spPr>
           <a:xfrm>
-            <a:off x="743040" y="2130480"/>
-            <a:ext cx="8418960" cy="1469880"/>
+            <a:off x="495000" y="273600"/>
+            <a:ext cx="8915040" cy="1145160"/>
           </a:xfrm>
           <a:prstGeom prst="rect">
             <a:avLst/>
@@ -832,8 +832,8 @@
         </p:nvSpPr>
         <p:spPr>
           <a:xfrm>
-            <a:off x="743040" y="2130480"/>
-            <a:ext cx="8418960" cy="1469880"/>
+            <a:off x="495000" y="273600"/>
+            <a:ext cx="8915040" cy="1145160"/>
           </a:xfrm>
           <a:prstGeom prst="rect">
             <a:avLst/>
@@ -933,8 +933,8 @@
         </p:nvSpPr>
         <p:spPr>
           <a:xfrm>
-            <a:off x="743040" y="2130480"/>
-            <a:ext cx="8418960" cy="1469880"/>
+            <a:off x="495000" y="273600"/>
+            <a:ext cx="8915040" cy="1145160"/>
           </a:xfrm>
           <a:prstGeom prst="rect">
             <a:avLst/>
@@ -982,8 +982,8 @@
         </p:nvSpPr>
         <p:spPr>
           <a:xfrm>
-            <a:off x="743040" y="2130480"/>
-            <a:ext cx="8418960" cy="3451320"/>
+            <a:off x="495000" y="273600"/>
+            <a:ext cx="8915040" cy="5308200"/>
           </a:xfrm>
           <a:prstGeom prst="rect">
             <a:avLst/>
@@ -1031,8 +1031,8 @@
         </p:nvSpPr>
         <p:spPr>
           <a:xfrm>
-            <a:off x="743040" y="2130480"/>
-            <a:ext cx="8418960" cy="1469880"/>
+            <a:off x="495000" y="273600"/>
+            <a:ext cx="8915040" cy="1145160"/>
           </a:xfrm>
           <a:prstGeom prst="rect">
             <a:avLst/>
@@ -1158,8 +1158,8 @@
         </p:nvSpPr>
         <p:spPr>
           <a:xfrm>
-            <a:off x="743040" y="2130480"/>
-            <a:ext cx="8418960" cy="1469880"/>
+            <a:off x="495000" y="273600"/>
+            <a:ext cx="8915040" cy="1145160"/>
           </a:xfrm>
           <a:prstGeom prst="rect">
             <a:avLst/>
@@ -1285,8 +1285,8 @@
         </p:nvSpPr>
         <p:spPr>
           <a:xfrm>
-            <a:off x="743040" y="2130480"/>
-            <a:ext cx="8418960" cy="1469880"/>
+            <a:off x="495000" y="273600"/>
+            <a:ext cx="8915040" cy="1145160"/>
           </a:xfrm>
           <a:prstGeom prst="rect">
             <a:avLst/>
@@ -1416,7 +1416,7 @@
         <p:spPr>
           <a:xfrm>
             <a:off x="-5040" y="0"/>
-            <a:ext cx="9910080" cy="1455120"/>
+            <a:ext cx="9909360" cy="1454400"/>
           </a:xfrm>
           <a:prstGeom prst="rect">
             <a:avLst/>
@@ -1446,7 +1446,7 @@
         <p:spPr>
           <a:xfrm>
             <a:off x="-5040" y="0"/>
-            <a:ext cx="9910080" cy="1254240"/>
+            <a:ext cx="9909360" cy="1253520"/>
           </a:xfrm>
           <a:prstGeom prst="rect">
             <a:avLst/>
@@ -1465,7 +1465,7 @@
         <p:spPr>
           <a:xfrm>
             <a:off x="-13680" y="6287760"/>
-            <a:ext cx="9918720" cy="572400"/>
+            <a:ext cx="9918000" cy="571680"/>
           </a:xfrm>
           <a:prstGeom prst="rect">
             <a:avLst/>
@@ -1495,7 +1495,7 @@
         <p:spPr>
           <a:xfrm>
             <a:off x="-13680" y="6391080"/>
-            <a:ext cx="9918720" cy="468720"/>
+            <a:ext cx="9918000" cy="468000"/>
           </a:xfrm>
           <a:prstGeom prst="rect">
             <a:avLst/>
@@ -1517,8 +1517,8 @@
         </p:nvSpPr>
         <p:spPr>
           <a:xfrm>
-            <a:off x="743040" y="2130480"/>
-            <a:ext cx="8418960" cy="1469520"/>
+            <a:off x="495000" y="273600"/>
+            <a:ext cx="8915040" cy="1144800"/>
           </a:xfrm>
           <a:prstGeom prst="rect">
             <a:avLst/>
@@ -1527,6 +1527,7 @@
         <p:txBody>
           <a:bodyPr anchor="ctr" bIns="0" lIns="0" rIns="0" tIns="0" wrap="none"/>
           <a:p>
+            <a:pPr algn="ctr"/>
             <a:r>
               <a:rPr lang="en-US"/>
               <a:t>Click to edit the title text format</a:t>
@@ -1695,7 +1696,7 @@
         <p:spPr>
           <a:xfrm>
             <a:off x="379440" y="6445800"/>
-            <a:ext cx="1233360" cy="218160"/>
+            <a:ext cx="1232640" cy="217440"/>
           </a:xfrm>
           <a:prstGeom prst="rect">
             <a:avLst/>
@@ -1732,7 +1733,7 @@
         <p:spPr>
           <a:xfrm>
             <a:off x="379440" y="6664680"/>
-            <a:ext cx="1233360" cy="146160"/>
+            <a:ext cx="1232640" cy="145440"/>
           </a:xfrm>
           <a:prstGeom prst="rect">
             <a:avLst/>
@@ -1775,7 +1776,7 @@
         <p:spPr>
           <a:xfrm>
             <a:off x="56880" y="6460920"/>
-            <a:ext cx="321840" cy="336240"/>
+            <a:ext cx="321120" cy="335520"/>
           </a:xfrm>
           <a:prstGeom prst="rect">
             <a:avLst/>
@@ -1841,7 +1842,7 @@
         <p:spPr>
           <a:xfrm>
             <a:off x="8899560" y="165600"/>
-            <a:ext cx="863280" cy="769320"/>
+            <a:ext cx="862560" cy="768600"/>
           </a:xfrm>
           <a:prstGeom prst="rect">
             <a:avLst/>
@@ -1901,7 +1902,7 @@
         <p:spPr>
           <a:xfrm>
             <a:off x="95760" y="94680"/>
-            <a:ext cx="946080" cy="447840"/>
+            <a:ext cx="945360" cy="447120"/>
           </a:xfrm>
           <a:prstGeom prst="rect">
             <a:avLst/>
@@ -1944,7 +1945,7 @@
         <p:spPr>
           <a:xfrm>
             <a:off x="5669280" y="4124160"/>
-            <a:ext cx="4398840" cy="2093760"/>
+            <a:ext cx="4398120" cy="2093040"/>
           </a:xfrm>
           <a:prstGeom prst="rect">
             <a:avLst/>
@@ -1966,7 +1967,7 @@
         <p:spPr>
           <a:xfrm>
             <a:off x="7703640" y="1737360"/>
-            <a:ext cx="2080440" cy="2085120"/>
+            <a:ext cx="2079720" cy="2084400"/>
           </a:xfrm>
           <a:prstGeom prst="rect">
             <a:avLst/>
@@ -1988,7 +1989,7 @@
         <p:spPr>
           <a:xfrm>
             <a:off x="91440" y="1828800"/>
-            <a:ext cx="2103120" cy="2103120"/>
+            <a:ext cx="2102400" cy="2102400"/>
           </a:xfrm>
           <a:prstGeom prst="rect">
             <a:avLst/>
@@ -2010,7 +2011,7 @@
         <p:spPr>
           <a:xfrm>
             <a:off x="457200" y="4154040"/>
-            <a:ext cx="2367360" cy="2063880"/>
+            <a:ext cx="2366640" cy="2063160"/>
           </a:xfrm>
           <a:prstGeom prst="rect">
             <a:avLst/>
@@ -2025,8 +2026,8 @@
         </p:nvSpPr>
         <p:spPr>
           <a:xfrm>
-            <a:off x="1005840" y="0"/>
-            <a:ext cx="7772400" cy="1280160"/>
+            <a:off x="548640" y="0"/>
+            <a:ext cx="8595360" cy="1279440"/>
           </a:xfrm>
           <a:prstGeom prst="rect">
             <a:avLst/>
@@ -2070,6 +2071,24 @@
             </a:r>
             <a:endParaRPr/>
           </a:p>
+          <a:p>
+            <a:pPr algn="ctr">
+              <a:lnSpc>
+                <a:spcPct val="100000"/>
+              </a:lnSpc>
+            </a:pPr>
+            <a:r>
+              <a:rPr lang="en-US" sz="2800">
+                <a:solidFill>
+                  <a:srgbClr val="ffffff"/>
+                </a:solidFill>
+                <a:latin typeface="メイリオ"/>
+                <a:ea typeface="メイリオ"/>
+              </a:rPr>
+              <a:t>Tokyo Institute of Technology computer science</a:t>
+            </a:r>
+            <a:endParaRPr/>
+          </a:p>
         </p:txBody>
       </p:sp>
       <p:sp>
@@ -2081,7 +2100,7 @@
         <p:spPr>
           <a:xfrm>
             <a:off x="2103120" y="2103120"/>
-            <a:ext cx="5669280" cy="1280160"/>
+            <a:ext cx="5668560" cy="1279440"/>
           </a:xfrm>
           <a:prstGeom prst="rect">
             <a:avLst/>
@@ -2118,7 +2137,7 @@
         <p:spPr>
           <a:xfrm>
             <a:off x="2834640" y="3657600"/>
-            <a:ext cx="2834640" cy="2743200"/>
+            <a:ext cx="2833920" cy="2742480"/>
           </a:xfrm>
           <a:prstGeom prst="rect">
             <a:avLst/>
@@ -2154,8 +2173,8 @@
         </p:nvSpPr>
         <p:spPr>
           <a:xfrm>
-            <a:off x="2103120" y="6400800"/>
-            <a:ext cx="8138160" cy="457200"/>
+            <a:off x="2103480" y="6858360"/>
+            <a:ext cx="8137440" cy="456480"/>
           </a:xfrm>
           <a:prstGeom prst="rect">
             <a:avLst/>

</xml_diff>

<commit_message>
Department of computer science, align sushi
</commit_message>
<xml_diff>
--- a/HOCKING-SVMcompare-sushi-slide.pptx
+++ b/HOCKING-SVMcompare-sushi-slide.pptx
@@ -176,7 +176,7 @@
           <a:bodyPr anchor="b" bIns="0" lIns="0" rIns="0" tIns="0" wrap="none"/>
           <a:p>
             <a:pPr algn="r"/>
-            <a:fld id="{D18121D1-01C1-41A1-91C1-01B1C14141E1}" type="slidenum">
+            <a:fld id="{51812181-5161-41D1-9161-A1A1216141E1}" type="slidenum">
               <a:rPr lang="en-US"/>
               <a:t>&lt;number&gt;</a:t>
             </a:fld>
@@ -209,7 +209,7 @@
       </p:grpSpPr>
       <p:sp>
         <p:nvSpPr>
-          <p:cNvPr id="60" name="PlaceHolder 1"/>
+          <p:cNvPr id="61" name="PlaceHolder 1"/>
           <p:cNvSpPr>
             <a:spLocks noGrp="1"/>
           </p:cNvSpPr>
@@ -220,7 +220,7 @@
         <p:spPr>
           <a:xfrm>
             <a:off x="0" y="0"/>
-            <a:ext cx="11795760" cy="11795760"/>
+            <a:ext cx="11795400" cy="11795400"/>
           </a:xfrm>
           <a:prstGeom prst="rect">
             <a:avLst/>
@@ -235,14 +235,14 @@
       </p:sp>
       <p:sp>
         <p:nvSpPr>
-          <p:cNvPr id="61" name="CustomShape 2"/>
+          <p:cNvPr id="62" name="CustomShape 2"/>
           <p:cNvSpPr/>
           <p:nvPr/>
         </p:nvSpPr>
         <p:spPr>
           <a:xfrm>
             <a:off x="0" y="0"/>
-            <a:ext cx="11795760" cy="11795760"/>
+            <a:ext cx="11795400" cy="11795400"/>
           </a:xfrm>
           <a:prstGeom prst="rect">
             <a:avLst/>
@@ -256,7 +256,7 @@
                 <a:spcPct val="100000"/>
               </a:lnSpc>
             </a:pPr>
-            <a:fld id="{C1F10131-F161-41D1-91A1-41B1E141B151}" type="slidenum">
+            <a:fld id="{E1217181-91B1-41C1-B171-D121C101F181}" type="slidenum">
               <a:rPr lang="en-US" sz="600">
                 <a:solidFill>
                   <a:srgbClr val="000000"/>
@@ -1416,7 +1416,7 @@
         <p:spPr>
           <a:xfrm>
             <a:off x="-5040" y="0"/>
-            <a:ext cx="9909360" cy="1454400"/>
+            <a:ext cx="9909000" cy="1454040"/>
           </a:xfrm>
           <a:prstGeom prst="rect">
             <a:avLst/>
@@ -1446,7 +1446,7 @@
         <p:spPr>
           <a:xfrm>
             <a:off x="-5040" y="0"/>
-            <a:ext cx="9909360" cy="1253520"/>
+            <a:ext cx="9909000" cy="1253160"/>
           </a:xfrm>
           <a:prstGeom prst="rect">
             <a:avLst/>
@@ -1465,7 +1465,7 @@
         <p:spPr>
           <a:xfrm>
             <a:off x="-13680" y="6287760"/>
-            <a:ext cx="9918000" cy="571680"/>
+            <a:ext cx="9917640" cy="571320"/>
           </a:xfrm>
           <a:prstGeom prst="rect">
             <a:avLst/>
@@ -1495,7 +1495,7 @@
         <p:spPr>
           <a:xfrm>
             <a:off x="-13680" y="6391080"/>
-            <a:ext cx="9918000" cy="468000"/>
+            <a:ext cx="9917640" cy="467640"/>
           </a:xfrm>
           <a:prstGeom prst="rect">
             <a:avLst/>
@@ -1696,7 +1696,7 @@
         <p:spPr>
           <a:xfrm>
             <a:off x="379440" y="6445800"/>
-            <a:ext cx="1232640" cy="217440"/>
+            <a:ext cx="1232280" cy="217080"/>
           </a:xfrm>
           <a:prstGeom prst="rect">
             <a:avLst/>
@@ -1733,7 +1733,7 @@
         <p:spPr>
           <a:xfrm>
             <a:off x="379440" y="6664680"/>
-            <a:ext cx="1232640" cy="145440"/>
+            <a:ext cx="1232280" cy="145080"/>
           </a:xfrm>
           <a:prstGeom prst="rect">
             <a:avLst/>
@@ -1776,7 +1776,7 @@
         <p:spPr>
           <a:xfrm>
             <a:off x="56880" y="6460920"/>
-            <a:ext cx="321120" cy="335520"/>
+            <a:ext cx="320760" cy="335160"/>
           </a:xfrm>
           <a:prstGeom prst="rect">
             <a:avLst/>
@@ -1842,7 +1842,7 @@
         <p:spPr>
           <a:xfrm>
             <a:off x="8899560" y="165600"/>
-            <a:ext cx="862560" cy="768600"/>
+            <a:ext cx="862200" cy="768240"/>
           </a:xfrm>
           <a:prstGeom prst="rect">
             <a:avLst/>
@@ -1902,7 +1902,7 @@
         <p:spPr>
           <a:xfrm>
             <a:off x="95760" y="94680"/>
-            <a:ext cx="945360" cy="447120"/>
+            <a:ext cx="945000" cy="446760"/>
           </a:xfrm>
           <a:prstGeom prst="rect">
             <a:avLst/>
@@ -1945,7 +1945,7 @@
         <p:spPr>
           <a:xfrm>
             <a:off x="5669280" y="4124160"/>
-            <a:ext cx="4398120" cy="2093040"/>
+            <a:ext cx="4397760" cy="2092680"/>
           </a:xfrm>
           <a:prstGeom prst="rect">
             <a:avLst/>
@@ -1967,7 +1967,7 @@
         <p:spPr>
           <a:xfrm>
             <a:off x="7703640" y="1737360"/>
-            <a:ext cx="2079720" cy="2084400"/>
+            <a:ext cx="2079360" cy="2084040"/>
           </a:xfrm>
           <a:prstGeom prst="rect">
             <a:avLst/>
@@ -1989,7 +1989,7 @@
         <p:spPr>
           <a:xfrm>
             <a:off x="91440" y="1828800"/>
-            <a:ext cx="2102400" cy="2102400"/>
+            <a:ext cx="2102040" cy="2102040"/>
           </a:xfrm>
           <a:prstGeom prst="rect">
             <a:avLst/>
@@ -2011,7 +2011,7 @@
         <p:spPr>
           <a:xfrm>
             <a:off x="457200" y="4154040"/>
-            <a:ext cx="2366640" cy="2063160"/>
+            <a:ext cx="2366280" cy="2062800"/>
           </a:xfrm>
           <a:prstGeom prst="rect">
             <a:avLst/>
@@ -2027,7 +2027,7 @@
         <p:spPr>
           <a:xfrm>
             <a:off x="548640" y="0"/>
-            <a:ext cx="8595360" cy="1279440"/>
+            <a:ext cx="8595000" cy="914400"/>
           </a:xfrm>
           <a:prstGeom prst="rect">
             <a:avLst/>
@@ -2071,24 +2071,6 @@
             </a:r>
             <a:endParaRPr/>
           </a:p>
-          <a:p>
-            <a:pPr algn="ctr">
-              <a:lnSpc>
-                <a:spcPct val="100000"/>
-              </a:lnSpc>
-            </a:pPr>
-            <a:r>
-              <a:rPr lang="en-US" sz="2800">
-                <a:solidFill>
-                  <a:srgbClr val="ffffff"/>
-                </a:solidFill>
-                <a:latin typeface="メイリオ"/>
-                <a:ea typeface="メイリオ"/>
-              </a:rPr>
-              <a:t>Tokyo Institute of Technology computer science</a:t>
-            </a:r>
-            <a:endParaRPr/>
-          </a:p>
         </p:txBody>
       </p:sp>
       <p:sp>
@@ -2100,7 +2082,7 @@
         <p:spPr>
           <a:xfrm>
             <a:off x="2103120" y="2103120"/>
-            <a:ext cx="5668560" cy="1279440"/>
+            <a:ext cx="5668200" cy="1279080"/>
           </a:xfrm>
           <a:prstGeom prst="rect">
             <a:avLst/>
@@ -2137,7 +2119,7 @@
         <p:spPr>
           <a:xfrm>
             <a:off x="2834640" y="3657600"/>
-            <a:ext cx="2833920" cy="2742480"/>
+            <a:ext cx="2833560" cy="2742120"/>
           </a:xfrm>
           <a:prstGeom prst="rect">
             <a:avLst/>
@@ -2174,7 +2156,7 @@
         <p:spPr>
           <a:xfrm>
             <a:off x="2103480" y="6858360"/>
-            <a:ext cx="8137440" cy="456480"/>
+            <a:ext cx="8137080" cy="456120"/>
           </a:xfrm>
           <a:prstGeom prst="rect">
             <a:avLst/>
@@ -2197,6 +2179,43 @@
                 <a:ea typeface="メイリオ"/>
               </a:rPr>
               <a:t>Photo credit: S Spanurattana</a:t>
+            </a:r>
+            <a:endParaRPr/>
+          </a:p>
+        </p:txBody>
+      </p:sp>
+      <p:sp>
+        <p:nvSpPr>
+          <p:cNvPr id="60" name="CustomShape 8"/>
+          <p:cNvSpPr/>
+          <p:nvPr/>
+        </p:nvSpPr>
+        <p:spPr>
+          <a:xfrm>
+            <a:off x="548640" y="822960"/>
+            <a:ext cx="8595000" cy="457200"/>
+          </a:xfrm>
+          <a:prstGeom prst="rect">
+            <a:avLst/>
+          </a:prstGeom>
+        </p:spPr>
+        <p:txBody>
+          <a:bodyPr anchor="ctr" bIns="10440" lIns="20880" rIns="20880" tIns="10440"/>
+          <a:p>
+            <a:pPr algn="ctr">
+              <a:lnSpc>
+                <a:spcPct val="100000"/>
+              </a:lnSpc>
+            </a:pPr>
+            <a:r>
+              <a:rPr lang="en-US" sz="2000">
+                <a:solidFill>
+                  <a:srgbClr val="ffffff"/>
+                </a:solidFill>
+                <a:latin typeface="メイリオ"/>
+                <a:ea typeface="メイリオ"/>
+              </a:rPr>
+              <a:t>Tokyo Institute of Technology Department of Computer Science</a:t>
             </a:r>
             <a:endParaRPr/>
           </a:p>

</xml_diff>